<commit_message>
added revised presentation as of 2230 3 28 2012
</commit_message>
<xml_diff>
--- a/MidTerm/Midterm_presentation_SEMRS.pptx
+++ b/MidTerm/Midterm_presentation_SEMRS.pptx
@@ -910,16 +910,362 @@
             <a:endParaRPr lang="en-US" dirty="0" smtClean="0"/>
           </a:p>
           <a:p>
+            <a:endParaRPr lang="en-US" dirty="0" smtClean="0"/>
+          </a:p>
+          <a:p>
             <a:r>
               <a:rPr lang="en-US" dirty="0" smtClean="0"/>
               <a:t>THIRRA-  </a:t>
             </a:r>
+            <a:r>
+              <a:rPr lang="en-US" sz="1200" b="0" i="0" kern="1200" dirty="0" smtClean="0">
+                <a:solidFill>
+                  <a:schemeClr val="tx1"/>
+                </a:solidFill>
+                <a:effectLst/>
+                <a:latin typeface="+mn-lt"/>
+                <a:ea typeface="+mn-ea"/>
+                <a:cs typeface="+mn-cs"/>
+              </a:rPr>
+              <a:t> project title Portable System </a:t>
+            </a:r>
+            <a:r>
+              <a:rPr lang="en-US" sz="1200" b="0" i="0" kern="1200" dirty="0" err="1" smtClean="0">
+                <a:solidFill>
+                  <a:schemeClr val="tx1"/>
+                </a:solidFill>
+                <a:effectLst/>
+                <a:latin typeface="+mn-lt"/>
+                <a:ea typeface="+mn-ea"/>
+                <a:cs typeface="+mn-cs"/>
+              </a:rPr>
+              <a:t>for</a:t>
+            </a:r>
+            <a:r>
+              <a:rPr lang="en-US" sz="1200" b="1" i="0" kern="1200" dirty="0" err="1" smtClean="0">
+                <a:solidFill>
+                  <a:schemeClr val="tx1"/>
+                </a:solidFill>
+                <a:effectLst/>
+                <a:latin typeface="+mn-lt"/>
+                <a:ea typeface="+mn-ea"/>
+                <a:cs typeface="+mn-cs"/>
+              </a:rPr>
+              <a:t>T</a:t>
+            </a:r>
+            <a:r>
+              <a:rPr lang="en-US" sz="1200" b="0" i="0" kern="1200" dirty="0" err="1" smtClean="0">
+                <a:solidFill>
+                  <a:schemeClr val="tx1"/>
+                </a:solidFill>
+                <a:effectLst/>
+                <a:latin typeface="+mn-lt"/>
+                <a:ea typeface="+mn-ea"/>
+                <a:cs typeface="+mn-cs"/>
+              </a:rPr>
+              <a:t>eleHealth</a:t>
+            </a:r>
+            <a:r>
+              <a:rPr lang="en-US" sz="1200" b="0" i="0" kern="1200" dirty="0" smtClean="0">
+                <a:solidFill>
+                  <a:schemeClr val="tx1"/>
+                </a:solidFill>
+                <a:effectLst/>
+                <a:latin typeface="+mn-lt"/>
+                <a:ea typeface="+mn-ea"/>
+                <a:cs typeface="+mn-cs"/>
+              </a:rPr>
+              <a:t> and </a:t>
+            </a:r>
+            <a:r>
+              <a:rPr lang="en-US" sz="1200" b="1" i="0" kern="1200" dirty="0" smtClean="0">
+                <a:solidFill>
+                  <a:schemeClr val="tx1"/>
+                </a:solidFill>
+                <a:effectLst/>
+                <a:latin typeface="+mn-lt"/>
+                <a:ea typeface="+mn-ea"/>
+                <a:cs typeface="+mn-cs"/>
+              </a:rPr>
+              <a:t>H</a:t>
+            </a:r>
+            <a:r>
+              <a:rPr lang="en-US" sz="1200" b="0" i="0" kern="1200" dirty="0" smtClean="0">
+                <a:solidFill>
+                  <a:schemeClr val="tx1"/>
+                </a:solidFill>
+                <a:effectLst/>
+                <a:latin typeface="+mn-lt"/>
+                <a:ea typeface="+mn-ea"/>
+                <a:cs typeface="+mn-cs"/>
+              </a:rPr>
+              <a:t>ealth </a:t>
+            </a:r>
+            <a:r>
+              <a:rPr lang="en-US" sz="1200" b="1" i="0" kern="1200" dirty="0" smtClean="0">
+                <a:solidFill>
+                  <a:schemeClr val="tx1"/>
+                </a:solidFill>
+                <a:effectLst/>
+                <a:latin typeface="+mn-lt"/>
+                <a:ea typeface="+mn-ea"/>
+                <a:cs typeface="+mn-cs"/>
+              </a:rPr>
+              <a:t>I</a:t>
+            </a:r>
+            <a:r>
+              <a:rPr lang="en-US" sz="1200" b="0" i="0" kern="1200" dirty="0" smtClean="0">
+                <a:solidFill>
+                  <a:schemeClr val="tx1"/>
+                </a:solidFill>
+                <a:effectLst/>
+                <a:latin typeface="+mn-lt"/>
+                <a:ea typeface="+mn-ea"/>
+                <a:cs typeface="+mn-cs"/>
+              </a:rPr>
+              <a:t>nformatics for </a:t>
+            </a:r>
+            <a:r>
+              <a:rPr lang="en-US" sz="1200" b="1" i="0" kern="1200" dirty="0" smtClean="0">
+                <a:solidFill>
+                  <a:schemeClr val="tx1"/>
+                </a:solidFill>
+                <a:effectLst/>
+                <a:latin typeface="+mn-lt"/>
+                <a:ea typeface="+mn-ea"/>
+                <a:cs typeface="+mn-cs"/>
+              </a:rPr>
+              <a:t>R</a:t>
+            </a:r>
+            <a:r>
+              <a:rPr lang="en-US" sz="1200" b="0" i="0" kern="1200" dirty="0" smtClean="0">
+                <a:solidFill>
+                  <a:schemeClr val="tx1"/>
+                </a:solidFill>
+                <a:effectLst/>
+                <a:latin typeface="+mn-lt"/>
+                <a:ea typeface="+mn-ea"/>
+                <a:cs typeface="+mn-cs"/>
+              </a:rPr>
+              <a:t>ural and </a:t>
+            </a:r>
+            <a:r>
+              <a:rPr lang="en-US" sz="1200" b="1" i="0" kern="1200" dirty="0" smtClean="0">
+                <a:solidFill>
+                  <a:schemeClr val="tx1"/>
+                </a:solidFill>
+                <a:effectLst/>
+                <a:latin typeface="+mn-lt"/>
+                <a:ea typeface="+mn-ea"/>
+                <a:cs typeface="+mn-cs"/>
+              </a:rPr>
+              <a:t>R</a:t>
+            </a:r>
+            <a:r>
+              <a:rPr lang="en-US" sz="1200" b="0" i="0" kern="1200" dirty="0" smtClean="0">
+                <a:solidFill>
+                  <a:schemeClr val="tx1"/>
+                </a:solidFill>
+                <a:effectLst/>
+                <a:latin typeface="+mn-lt"/>
+                <a:ea typeface="+mn-ea"/>
+                <a:cs typeface="+mn-cs"/>
+              </a:rPr>
+              <a:t>emote </a:t>
+            </a:r>
+            <a:r>
+              <a:rPr lang="en-US" sz="1200" b="1" i="0" kern="1200" dirty="0" smtClean="0">
+                <a:solidFill>
+                  <a:schemeClr val="tx1"/>
+                </a:solidFill>
+                <a:effectLst/>
+                <a:latin typeface="+mn-lt"/>
+                <a:ea typeface="+mn-ea"/>
+                <a:cs typeface="+mn-cs"/>
+              </a:rPr>
+              <a:t>A</a:t>
+            </a:r>
+            <a:r>
+              <a:rPr lang="en-US" sz="1200" b="0" i="0" kern="1200" dirty="0" smtClean="0">
+                <a:solidFill>
+                  <a:schemeClr val="tx1"/>
+                </a:solidFill>
+                <a:effectLst/>
+                <a:latin typeface="+mn-lt"/>
+                <a:ea typeface="+mn-ea"/>
+                <a:cs typeface="+mn-cs"/>
+              </a:rPr>
+              <a:t>reas. </a:t>
+            </a:r>
+          </a:p>
+          <a:p>
+            <a:r>
+              <a:rPr lang="en-US" sz="1200" b="0" i="0" kern="1200" dirty="0" smtClean="0">
+                <a:solidFill>
+                  <a:schemeClr val="tx1"/>
+                </a:solidFill>
+                <a:effectLst/>
+                <a:latin typeface="+mn-lt"/>
+                <a:ea typeface="+mn-ea"/>
+                <a:cs typeface="+mn-cs"/>
+              </a:rPr>
+              <a:t>Started in 2007,</a:t>
+            </a:r>
+            <a:r>
+              <a:rPr lang="en-US" sz="1200" b="0" i="0" kern="1200" baseline="0" dirty="0" smtClean="0">
+                <a:solidFill>
+                  <a:schemeClr val="tx1"/>
+                </a:solidFill>
+                <a:effectLst/>
+                <a:latin typeface="+mn-lt"/>
+                <a:ea typeface="+mn-ea"/>
+                <a:cs typeface="+mn-cs"/>
+              </a:rPr>
+              <a:t> Written in PHP, with a </a:t>
+            </a:r>
+            <a:r>
+              <a:rPr lang="en-US" sz="1200" b="0" i="0" kern="1200" baseline="0" dirty="0" err="1" smtClean="0">
+                <a:solidFill>
+                  <a:schemeClr val="tx1"/>
+                </a:solidFill>
+                <a:effectLst/>
+                <a:latin typeface="+mn-lt"/>
+                <a:ea typeface="+mn-ea"/>
+                <a:cs typeface="+mn-cs"/>
+              </a:rPr>
+              <a:t>PostgreSQL</a:t>
+            </a:r>
+            <a:r>
+              <a:rPr lang="en-US" sz="1200" b="0" i="0" kern="1200" baseline="0" dirty="0" smtClean="0">
+                <a:solidFill>
+                  <a:schemeClr val="tx1"/>
+                </a:solidFill>
+                <a:effectLst/>
+                <a:latin typeface="+mn-lt"/>
+                <a:ea typeface="+mn-ea"/>
+                <a:cs typeface="+mn-cs"/>
+              </a:rPr>
+              <a:t> database backend. </a:t>
+            </a:r>
+          </a:p>
+          <a:p>
+            <a:endParaRPr lang="en-US" dirty="0" smtClean="0"/>
           </a:p>
           <a:p>
             <a:r>
               <a:rPr lang="en-US" baseline="0" dirty="0" smtClean="0"/>
               <a:t>ZEPRS- </a:t>
             </a:r>
+            <a:r>
+              <a:rPr lang="en-US" sz="1200" b="0" i="0" kern="1200" dirty="0" smtClean="0">
+                <a:solidFill>
+                  <a:schemeClr val="tx1"/>
+                </a:solidFill>
+                <a:effectLst/>
+                <a:latin typeface="+mn-lt"/>
+                <a:ea typeface="+mn-ea"/>
+                <a:cs typeface="+mn-cs"/>
+              </a:rPr>
+              <a:t>The </a:t>
+            </a:r>
+            <a:r>
+              <a:rPr lang="en-US" sz="1200" b="1" i="0" kern="1200" dirty="0" smtClean="0">
+                <a:solidFill>
+                  <a:schemeClr val="tx1"/>
+                </a:solidFill>
+                <a:effectLst/>
+                <a:latin typeface="+mn-lt"/>
+                <a:ea typeface="+mn-ea"/>
+                <a:cs typeface="+mn-cs"/>
+              </a:rPr>
+              <a:t>Zambia Electronic </a:t>
+            </a:r>
+            <a:r>
+              <a:rPr lang="en-US" sz="1200" b="1" i="0" u="none" strike="noStrike" kern="1200" dirty="0" smtClean="0">
+                <a:solidFill>
+                  <a:schemeClr val="tx1"/>
+                </a:solidFill>
+                <a:effectLst/>
+                <a:latin typeface="+mn-lt"/>
+                <a:ea typeface="+mn-ea"/>
+                <a:cs typeface="+mn-cs"/>
+                <a:hlinkClick r:id="rId3" tooltip="Perinatal"/>
+              </a:rPr>
+              <a:t>Perinatal</a:t>
+            </a:r>
+            <a:r>
+              <a:rPr lang="en-US" sz="1200" b="1" i="0" kern="1200" dirty="0" smtClean="0">
+                <a:solidFill>
+                  <a:schemeClr val="tx1"/>
+                </a:solidFill>
+                <a:effectLst/>
+                <a:latin typeface="+mn-lt"/>
+                <a:ea typeface="+mn-ea"/>
+                <a:cs typeface="+mn-cs"/>
+              </a:rPr>
+              <a:t> Record System</a:t>
+            </a:r>
+            <a:r>
+              <a:rPr lang="en-US" sz="1200" b="0" i="0" kern="1200" dirty="0" smtClean="0">
+                <a:solidFill>
+                  <a:schemeClr val="tx1"/>
+                </a:solidFill>
+                <a:effectLst/>
+                <a:latin typeface="+mn-lt"/>
+                <a:ea typeface="+mn-ea"/>
+                <a:cs typeface="+mn-cs"/>
+              </a:rPr>
+              <a:t> (</a:t>
+            </a:r>
+            <a:r>
+              <a:rPr lang="en-US" sz="1200" b="1" i="0" kern="1200" dirty="0" smtClean="0">
+                <a:solidFill>
+                  <a:schemeClr val="tx1"/>
+                </a:solidFill>
+                <a:effectLst/>
+                <a:latin typeface="+mn-lt"/>
+                <a:ea typeface="+mn-ea"/>
+                <a:cs typeface="+mn-cs"/>
+              </a:rPr>
+              <a:t>ZEPRS</a:t>
+            </a:r>
+            <a:r>
+              <a:rPr lang="en-US" sz="1200" b="0" i="0" kern="1200" dirty="0" smtClean="0">
+                <a:solidFill>
+                  <a:schemeClr val="tx1"/>
+                </a:solidFill>
+                <a:effectLst/>
+                <a:latin typeface="+mn-lt"/>
+                <a:ea typeface="+mn-ea"/>
+                <a:cs typeface="+mn-cs"/>
+              </a:rPr>
+              <a:t>) </a:t>
+            </a:r>
+          </a:p>
+          <a:p>
+            <a:r>
+              <a:rPr lang="en-US" sz="1200" b="0" i="0" kern="1200" dirty="0" smtClean="0">
+                <a:solidFill>
+                  <a:schemeClr val="tx1"/>
+                </a:solidFill>
+                <a:effectLst/>
+                <a:latin typeface="+mn-lt"/>
+                <a:ea typeface="+mn-ea"/>
+                <a:cs typeface="+mn-cs"/>
+              </a:rPr>
+              <a:t>- For an obesity clinic</a:t>
+            </a:r>
+            <a:endParaRPr lang="en-US" dirty="0" smtClean="0"/>
+          </a:p>
+          <a:p>
+            <a:r>
+              <a:rPr lang="en-US" dirty="0" smtClean="0"/>
+              <a:t>-lacks security measures</a:t>
+            </a:r>
+            <a:r>
+              <a:rPr lang="en-US" baseline="0" dirty="0" smtClean="0"/>
+              <a:t> (i.e. encryption) </a:t>
+            </a:r>
             <a:endParaRPr lang="en-US" dirty="0" smtClean="0"/>
           </a:p>
           <a:p>
@@ -932,7 +1278,11 @@
             </a:r>
             <a:r>
               <a:rPr lang="en-US" dirty="0" smtClean="0"/>
-              <a:t> V 1.0 released in June 2001</a:t>
+              <a:t> </a:t>
+            </a:r>
+            <a:r>
+              <a:rPr lang="en-US" dirty="0" smtClean="0"/>
+              <a:t>V 1.0 released in June 2001</a:t>
             </a:r>
           </a:p>
           <a:p>
@@ -1024,6 +1374,20 @@
           <a:bodyPr/>
           <a:lstStyle/>
           <a:p>
+            <a:r>
+              <a:rPr lang="en-US" dirty="0" smtClean="0"/>
+              <a:t>-Taken out financial data</a:t>
+            </a:r>
+            <a:r>
+              <a:rPr lang="en-US" baseline="0" dirty="0" smtClean="0"/>
+              <a:t> </a:t>
+            </a:r>
+          </a:p>
+          <a:p>
+            <a:r>
+              <a:rPr lang="en-US" baseline="0" dirty="0" smtClean="0"/>
+              <a:t>-Safeguard, (electronic paper trail) </a:t>
+            </a:r>
             <a:endParaRPr lang="en-US" dirty="0"/>
           </a:p>
         </p:txBody>
@@ -4435,6 +4799,7 @@
           </a:bodyPr>
           <a:lstStyle/>
           <a:p>
+            <a:pPr algn="ctr"/>
             <a:r>
               <a:rPr lang="en-US" dirty="0" smtClean="0"/>
               <a:t>Summary of SEMRS</a:t>
@@ -4472,11 +4837,7 @@
             </a:pPr>
             <a:r>
               <a:rPr lang="en-US" sz="3200" dirty="0" smtClean="0"/>
-              <a:t>Motivation - </a:t>
-            </a:r>
-            <a:r>
-              <a:rPr lang="en-US" sz="3200" dirty="0" smtClean="0"/>
-              <a:t>Why we chose this project? </a:t>
+              <a:t>Motivation - Why we chose this project? </a:t>
             </a:r>
           </a:p>
           <a:p>
@@ -4487,11 +4848,7 @@
             </a:pPr>
             <a:r>
               <a:rPr lang="en-US" sz="3200" dirty="0" smtClean="0"/>
-              <a:t>Problem - </a:t>
-            </a:r>
-            <a:r>
-              <a:rPr lang="en-US" sz="3200" dirty="0" smtClean="0"/>
-              <a:t>What we are solving?</a:t>
+              <a:t>Problem - What we are solving?</a:t>
             </a:r>
           </a:p>
           <a:p>
@@ -4502,11 +4859,7 @@
             </a:pPr>
             <a:r>
               <a:rPr lang="en-US" sz="3200" dirty="0" smtClean="0"/>
-              <a:t>Solution - </a:t>
-            </a:r>
-            <a:r>
-              <a:rPr lang="en-US" sz="3200" dirty="0" smtClean="0"/>
-              <a:t>How we are fixing it?</a:t>
+              <a:t>Solution - How we are fixing it?</a:t>
             </a:r>
             <a:endParaRPr lang="en-US" sz="3200" dirty="0"/>
           </a:p>
@@ -4571,6 +4924,7 @@
           </a:bodyPr>
           <a:lstStyle/>
           <a:p>
+            <a:pPr algn="ctr"/>
             <a:r>
               <a:rPr lang="en-US" dirty="0" smtClean="0"/>
               <a:t>Medical Databases Overview </a:t>
@@ -4747,6 +5101,7 @@
           </a:bodyPr>
           <a:lstStyle/>
           <a:p>
+            <a:pPr algn="ctr"/>
             <a:r>
               <a:rPr lang="en-US" dirty="0" smtClean="0"/>
               <a:t>History of Past EMR Systems</a:t>
@@ -4901,6 +5256,7 @@
           </a:bodyPr>
           <a:lstStyle/>
           <a:p>
+            <a:pPr algn="ctr"/>
             <a:r>
               <a:rPr lang="en-US" dirty="0" smtClean="0"/>
               <a:t>How SEMRS is Different?</a:t>
@@ -4938,8 +5294,13 @@
             </a:pPr>
             <a:r>
               <a:rPr lang="en-US" sz="2800" dirty="0" smtClean="0"/>
-              <a:t>Simply a backup, not meant to replace paper files </a:t>
-            </a:r>
+              <a:t>Simply a backup, not meant to replace paper </a:t>
+            </a:r>
+            <a:r>
+              <a:rPr lang="en-US" sz="2800" dirty="0" smtClean="0"/>
+              <a:t>files. </a:t>
+            </a:r>
+            <a:endParaRPr lang="en-US" sz="2800" dirty="0" smtClean="0"/>
           </a:p>
           <a:p>
             <a:pPr>
@@ -4957,7 +5318,11 @@
             </a:r>
             <a:r>
               <a:rPr lang="en-US" sz="2800" dirty="0" smtClean="0"/>
-              <a:t>, took out many unneeded features </a:t>
+              <a:t>, took out many unneeded </a:t>
+            </a:r>
+            <a:r>
+              <a:rPr lang="en-US" sz="2800" dirty="0" smtClean="0"/>
+              <a:t>features. </a:t>
             </a:r>
             <a:endParaRPr lang="en-US" sz="2800" dirty="0"/>
           </a:p>
@@ -5022,6 +5387,7 @@
           </a:bodyPr>
           <a:lstStyle/>
           <a:p>
+            <a:pPr algn="ctr"/>
             <a:r>
               <a:rPr lang="en-US" dirty="0" smtClean="0"/>
               <a:t>Concepts Incorporated from </a:t>
@@ -5153,6 +5519,7 @@
           </a:bodyPr>
           <a:lstStyle/>
           <a:p>
+            <a:pPr algn="ctr"/>
             <a:r>
               <a:rPr lang="en-US" dirty="0" smtClean="0"/>
               <a:t>Where We are Today</a:t>
@@ -5190,8 +5557,13 @@
             </a:pPr>
             <a:r>
               <a:rPr lang="en-US" sz="2800" dirty="0" smtClean="0"/>
-              <a:t>Successfully Login as Admin or Physician</a:t>
-            </a:r>
+              <a:t>Successfully Login as Admin or </a:t>
+            </a:r>
+            <a:r>
+              <a:rPr lang="en-US" sz="2800" dirty="0" smtClean="0"/>
+              <a:t>Physician.</a:t>
+            </a:r>
+            <a:endParaRPr lang="en-US" sz="2800" dirty="0" smtClean="0"/>
           </a:p>
           <a:p>
             <a:pPr>
@@ -5201,8 +5573,13 @@
             </a:pPr>
             <a:r>
               <a:rPr lang="en-US" sz="2800" dirty="0" smtClean="0"/>
-              <a:t>Logout and return to login screen </a:t>
-            </a:r>
+              <a:t>Logout and return to login </a:t>
+            </a:r>
+            <a:r>
+              <a:rPr lang="en-US" sz="2800" dirty="0" smtClean="0"/>
+              <a:t>screen. </a:t>
+            </a:r>
+            <a:endParaRPr lang="en-US" sz="2800" dirty="0" smtClean="0"/>
           </a:p>
           <a:p>
             <a:pPr>
@@ -5212,8 +5589,13 @@
             </a:pPr>
             <a:r>
               <a:rPr lang="en-US" sz="2800" dirty="0" smtClean="0"/>
-              <a:t>Add/Remove users </a:t>
-            </a:r>
+              <a:t>Add/Remove </a:t>
+            </a:r>
+            <a:r>
+              <a:rPr lang="en-US" sz="2800" dirty="0" smtClean="0"/>
+              <a:t>users. </a:t>
+            </a:r>
+            <a:endParaRPr lang="en-US" sz="2800" dirty="0" smtClean="0"/>
           </a:p>
           <a:p>
             <a:pPr>
@@ -5223,7 +5605,22 @@
             </a:pPr>
             <a:r>
               <a:rPr lang="en-US" sz="2800" dirty="0" smtClean="0"/>
-              <a:t>Add Patients</a:t>
+              <a:t>Add </a:t>
+            </a:r>
+            <a:r>
+              <a:rPr lang="en-US" sz="2800" dirty="0" smtClean="0"/>
+              <a:t>Patients.</a:t>
+            </a:r>
+          </a:p>
+          <a:p>
+            <a:pPr>
+              <a:lnSpc>
+                <a:spcPct val="200000"/>
+              </a:lnSpc>
+            </a:pPr>
+            <a:r>
+              <a:rPr lang="en-US" sz="2800" dirty="0" smtClean="0"/>
+              <a:t>Store patient photos on server file system.</a:t>
             </a:r>
             <a:endParaRPr lang="en-US" sz="2800" dirty="0"/>
           </a:p>
@@ -5288,6 +5685,7 @@
           </a:bodyPr>
           <a:lstStyle/>
           <a:p>
+            <a:pPr algn="ctr"/>
             <a:r>
               <a:rPr lang="en-US" dirty="0" smtClean="0"/>
               <a:t>What Still Needs to be Done </a:t>
@@ -5336,8 +5734,31 @@
             </a:pPr>
             <a:r>
               <a:rPr lang="en-US" sz="2800" dirty="0" smtClean="0"/>
-              <a:t>Encrypting information in database.</a:t>
-            </a:r>
+              <a:t>Encrypting information in database</a:t>
+            </a:r>
+            <a:r>
+              <a:rPr lang="en-US" sz="2800" dirty="0" smtClean="0"/>
+              <a:t>.</a:t>
+            </a:r>
+          </a:p>
+          <a:p>
+            <a:pPr>
+              <a:lnSpc>
+                <a:spcPct val="200000"/>
+              </a:lnSpc>
+            </a:pPr>
+            <a:r>
+              <a:rPr lang="en-US" sz="2800" dirty="0" smtClean="0"/>
+              <a:t>Associate Image with patient. </a:t>
+            </a:r>
+          </a:p>
+          <a:p>
+            <a:pPr>
+              <a:lnSpc>
+                <a:spcPct val="200000"/>
+              </a:lnSpc>
+            </a:pPr>
+            <a:endParaRPr lang="en-US" sz="2800" dirty="0" smtClean="0"/>
           </a:p>
         </p:txBody>
       </p:sp>
@@ -5418,13 +5839,19 @@
             <p:ph type="title"/>
           </p:nvPr>
         </p:nvSpPr>
-        <p:spPr/>
+        <p:spPr>
+          <a:xfrm>
+            <a:off x="0" y="381000"/>
+            <a:ext cx="8458200" cy="793812"/>
+          </a:xfrm>
+        </p:spPr>
         <p:txBody>
           <a:bodyPr>
-            <a:normAutofit fontScale="90000"/>
+            <a:normAutofit/>
           </a:bodyPr>
           <a:lstStyle/>
           <a:p>
+            <a:pPr algn="ctr"/>
             <a:r>
               <a:rPr lang="en-US" dirty="0" smtClean="0"/>
               <a:t>References for this Presentation</a:t>
@@ -5443,7 +5870,12 @@
             <p:ph idx="1"/>
           </p:nvPr>
         </p:nvSpPr>
-        <p:spPr/>
+        <p:spPr>
+          <a:xfrm>
+            <a:off x="914400" y="1905001"/>
+            <a:ext cx="7315200" cy="4404360"/>
+          </a:xfrm>
+        </p:spPr>
         <p:txBody>
           <a:bodyPr>
             <a:normAutofit/>

</xml_diff>